<commit_message>
updating formatting on powerpoint and added a few extra graphs
</commit_message>
<xml_diff>
--- a/Cryptocurrency_Presentation.pptx
+++ b/Cryptocurrency_Presentation.pptx
@@ -16,7 +16,8 @@
     <p:sldId id="261" r:id="rId10"/>
     <p:sldId id="262" r:id="rId11"/>
     <p:sldId id="263" r:id="rId12"/>
-    <p:sldId id="264" r:id="rId13"/>
+    <p:sldId id="269" r:id="rId13"/>
+    <p:sldId id="264" r:id="rId14"/>
   </p:sldIdLst>
   <p:sldSz cx="12192000" cy="6858000"/>
   <p:notesSz cx="6858000" cy="9144000"/>
@@ -270,7 +271,7 @@
           <a:p>
             <a:fld id="{F664B0EE-B537-42B8-9038-0F98724E1F9E}" type="datetimeFigureOut">
               <a:rPr lang="en-US" smtClean="0"/>
-              <a:t>10/27/2020</a:t>
+              <a:t>10/28/2020</a:t>
             </a:fld>
             <a:endParaRPr lang="en-US"/>
           </a:p>
@@ -468,7 +469,7 @@
           <a:p>
             <a:fld id="{F664B0EE-B537-42B8-9038-0F98724E1F9E}" type="datetimeFigureOut">
               <a:rPr lang="en-US" smtClean="0"/>
-              <a:t>10/27/2020</a:t>
+              <a:t>10/28/2020</a:t>
             </a:fld>
             <a:endParaRPr lang="en-US"/>
           </a:p>
@@ -676,7 +677,7 @@
           <a:p>
             <a:fld id="{F664B0EE-B537-42B8-9038-0F98724E1F9E}" type="datetimeFigureOut">
               <a:rPr lang="en-US" smtClean="0"/>
-              <a:t>10/27/2020</a:t>
+              <a:t>10/28/2020</a:t>
             </a:fld>
             <a:endParaRPr lang="en-US"/>
           </a:p>
@@ -874,7 +875,7 @@
           <a:p>
             <a:fld id="{F664B0EE-B537-42B8-9038-0F98724E1F9E}" type="datetimeFigureOut">
               <a:rPr lang="en-US" smtClean="0"/>
-              <a:t>10/27/2020</a:t>
+              <a:t>10/28/2020</a:t>
             </a:fld>
             <a:endParaRPr lang="en-US"/>
           </a:p>
@@ -1149,7 +1150,7 @@
           <a:p>
             <a:fld id="{F664B0EE-B537-42B8-9038-0F98724E1F9E}" type="datetimeFigureOut">
               <a:rPr lang="en-US" smtClean="0"/>
-              <a:t>10/27/2020</a:t>
+              <a:t>10/28/2020</a:t>
             </a:fld>
             <a:endParaRPr lang="en-US"/>
           </a:p>
@@ -1414,7 +1415,7 @@
           <a:p>
             <a:fld id="{F664B0EE-B537-42B8-9038-0F98724E1F9E}" type="datetimeFigureOut">
               <a:rPr lang="en-US" smtClean="0"/>
-              <a:t>10/27/2020</a:t>
+              <a:t>10/28/2020</a:t>
             </a:fld>
             <a:endParaRPr lang="en-US"/>
           </a:p>
@@ -1826,7 +1827,7 @@
           <a:p>
             <a:fld id="{F664B0EE-B537-42B8-9038-0F98724E1F9E}" type="datetimeFigureOut">
               <a:rPr lang="en-US" smtClean="0"/>
-              <a:t>10/27/2020</a:t>
+              <a:t>10/28/2020</a:t>
             </a:fld>
             <a:endParaRPr lang="en-US"/>
           </a:p>
@@ -1967,7 +1968,7 @@
           <a:p>
             <a:fld id="{F664B0EE-B537-42B8-9038-0F98724E1F9E}" type="datetimeFigureOut">
               <a:rPr lang="en-US" smtClean="0"/>
-              <a:t>10/27/2020</a:t>
+              <a:t>10/28/2020</a:t>
             </a:fld>
             <a:endParaRPr lang="en-US"/>
           </a:p>
@@ -2080,7 +2081,7 @@
           <a:p>
             <a:fld id="{F664B0EE-B537-42B8-9038-0F98724E1F9E}" type="datetimeFigureOut">
               <a:rPr lang="en-US" smtClean="0"/>
-              <a:t>10/27/2020</a:t>
+              <a:t>10/28/2020</a:t>
             </a:fld>
             <a:endParaRPr lang="en-US"/>
           </a:p>
@@ -2391,7 +2392,7 @@
           <a:p>
             <a:fld id="{F664B0EE-B537-42B8-9038-0F98724E1F9E}" type="datetimeFigureOut">
               <a:rPr lang="en-US" smtClean="0"/>
-              <a:t>10/27/2020</a:t>
+              <a:t>10/28/2020</a:t>
             </a:fld>
             <a:endParaRPr lang="en-US"/>
           </a:p>
@@ -2679,7 +2680,7 @@
           <a:p>
             <a:fld id="{F664B0EE-B537-42B8-9038-0F98724E1F9E}" type="datetimeFigureOut">
               <a:rPr lang="en-US" smtClean="0"/>
-              <a:t>10/27/2020</a:t>
+              <a:t>10/28/2020</a:t>
             </a:fld>
             <a:endParaRPr lang="en-US"/>
           </a:p>
@@ -2920,7 +2921,7 @@
           <a:p>
             <a:fld id="{F664B0EE-B537-42B8-9038-0F98724E1F9E}" type="datetimeFigureOut">
               <a:rPr lang="en-US" smtClean="0"/>
-              <a:t>10/27/2020</a:t>
+              <a:t>10/28/2020</a:t>
             </a:fld>
             <a:endParaRPr lang="en-US"/>
           </a:p>
@@ -3323,6 +3324,21 @@
 <file path=ppt/slides/slide1.xml><?xml version="1.0" encoding="utf-8"?>
 <p:sld xmlns:a="http://schemas.openxmlformats.org/drawingml/2006/main" xmlns:r="http://schemas.openxmlformats.org/officeDocument/2006/relationships" xmlns:p="http://schemas.openxmlformats.org/presentationml/2006/main">
   <p:cSld>
+    <p:bg>
+      <p:bgPr>
+        <a:pattFill prst="horzBrick">
+          <a:fgClr>
+            <a:schemeClr val="bg1">
+              <a:lumMod val="75000"/>
+            </a:schemeClr>
+          </a:fgClr>
+          <a:bgClr>
+            <a:schemeClr val="bg1"/>
+          </a:bgClr>
+        </a:pattFill>
+        <a:effectLst/>
+      </p:bgPr>
+    </p:bg>
     <p:spTree>
       <p:nvGrpSpPr>
         <p:cNvPr id="1" name=""/>
@@ -3716,6 +3732,41 @@
 <file path=ppt/slides/slide11.xml><?xml version="1.0" encoding="utf-8"?>
 <p:sld xmlns:a="http://schemas.openxmlformats.org/drawingml/2006/main" xmlns:r="http://schemas.openxmlformats.org/officeDocument/2006/relationships" xmlns:p="http://schemas.openxmlformats.org/presentationml/2006/main">
   <p:cSld>
+    <p:bg>
+      <p:bgPr>
+        <a:gradFill flip="none" rotWithShape="1">
+          <a:gsLst>
+            <a:gs pos="0">
+              <a:schemeClr val="accent4">
+                <a:lumMod val="5000"/>
+                <a:lumOff val="95000"/>
+              </a:schemeClr>
+            </a:gs>
+            <a:gs pos="74000">
+              <a:schemeClr val="accent4">
+                <a:lumMod val="45000"/>
+                <a:lumOff val="55000"/>
+              </a:schemeClr>
+            </a:gs>
+            <a:gs pos="83000">
+              <a:schemeClr val="accent4">
+                <a:lumMod val="45000"/>
+                <a:lumOff val="55000"/>
+              </a:schemeClr>
+            </a:gs>
+            <a:gs pos="100000">
+              <a:schemeClr val="accent4">
+                <a:lumMod val="30000"/>
+                <a:lumOff val="70000"/>
+              </a:schemeClr>
+            </a:gs>
+          </a:gsLst>
+          <a:lin ang="5400000" scaled="1"/>
+          <a:tileRect/>
+        </a:gradFill>
+        <a:effectLst/>
+      </p:bgPr>
+    </p:bg>
     <p:spTree>
       <p:nvGrpSpPr>
         <p:cNvPr id="1" name=""/>
@@ -3754,45 +3805,73 @@
           <a:lstStyle/>
           <a:p>
             <a:r>
-              <a:rPr lang="en-US" dirty="0">
-                <a:highlight>
-                  <a:srgbClr val="FFFF00"/>
-                </a:highlight>
-              </a:rPr>
-              <a:t>Does social media popularity contribute to pricing changes?</a:t>
+              <a:rPr lang="en-US"/>
+              <a:t>Does social media influence pricing changes?</a:t>
             </a:r>
             <a:endParaRPr lang="en-US" dirty="0"/>
           </a:p>
         </p:txBody>
       </p:sp>
-      <p:sp>
-        <p:nvSpPr>
-          <p:cNvPr id="3" name="Content Placeholder 2">
-            <a:extLst>
-              <a:ext uri="{FF2B5EF4-FFF2-40B4-BE49-F238E27FC236}">
-                <a16:creationId xmlns:a16="http://schemas.microsoft.com/office/drawing/2014/main" id="{EFEA17DC-6C93-4173-8A45-1B2B4DA73E66}"/>
-              </a:ext>
-            </a:extLst>
-          </p:cNvPr>
-          <p:cNvSpPr>
-            <a:spLocks noGrp="1"/>
-          </p:cNvSpPr>
-          <p:nvPr>
-            <p:ph idx="1"/>
-          </p:nvPr>
-        </p:nvSpPr>
-        <p:spPr/>
-        <p:txBody>
-          <a:bodyPr/>
-          <a:lstStyle/>
-          <a:p>
-            <a:r>
-              <a:rPr lang="en-US" dirty="0"/>
-              <a:t>Is there a relationship between media popularity that influences pricing changes?</a:t>
-            </a:r>
-          </a:p>
-        </p:txBody>
-      </p:sp>
+      <p:pic>
+        <p:nvPicPr>
+          <p:cNvPr id="5" name="Picture 4">
+            <a:extLst>
+              <a:ext uri="{FF2B5EF4-FFF2-40B4-BE49-F238E27FC236}">
+                <a16:creationId xmlns:a16="http://schemas.microsoft.com/office/drawing/2014/main" id="{F7EB9580-A1EB-4F89-A32B-25D16FBF6760}"/>
+              </a:ext>
+            </a:extLst>
+          </p:cNvPr>
+          <p:cNvPicPr>
+            <a:picLocks noChangeAspect="1"/>
+          </p:cNvPicPr>
+          <p:nvPr/>
+        </p:nvPicPr>
+        <p:blipFill>
+          <a:blip r:embed="rId2"/>
+          <a:stretch>
+            <a:fillRect/>
+          </a:stretch>
+        </p:blipFill>
+        <p:spPr>
+          <a:xfrm>
+            <a:off x="734179" y="1690688"/>
+            <a:ext cx="5113293" cy="3935230"/>
+          </a:xfrm>
+          <a:prstGeom prst="rect">
+            <a:avLst/>
+          </a:prstGeom>
+        </p:spPr>
+      </p:pic>
+      <p:pic>
+        <p:nvPicPr>
+          <p:cNvPr id="7" name="Picture 6">
+            <a:extLst>
+              <a:ext uri="{FF2B5EF4-FFF2-40B4-BE49-F238E27FC236}">
+                <a16:creationId xmlns:a16="http://schemas.microsoft.com/office/drawing/2014/main" id="{51E7C45E-581B-4400-BAB3-609A7F533BE1}"/>
+              </a:ext>
+            </a:extLst>
+          </p:cNvPr>
+          <p:cNvPicPr>
+            <a:picLocks noChangeAspect="1"/>
+          </p:cNvPicPr>
+          <p:nvPr/>
+        </p:nvPicPr>
+        <p:blipFill>
+          <a:blip r:embed="rId3"/>
+          <a:stretch>
+            <a:fillRect/>
+          </a:stretch>
+        </p:blipFill>
+        <p:spPr>
+          <a:xfrm>
+            <a:off x="6344529" y="2180266"/>
+            <a:ext cx="5318762" cy="4142497"/>
+          </a:xfrm>
+          <a:prstGeom prst="rect">
+            <a:avLst/>
+          </a:prstGeom>
+        </p:spPr>
+      </p:pic>
     </p:spTree>
     <p:extLst>
       <p:ext uri="{BB962C8B-B14F-4D97-AF65-F5344CB8AC3E}">
@@ -3809,6 +3888,22 @@
 <file path=ppt/slides/slide12.xml><?xml version="1.0" encoding="utf-8"?>
 <p:sld xmlns:a="http://schemas.openxmlformats.org/drawingml/2006/main" xmlns:r="http://schemas.openxmlformats.org/officeDocument/2006/relationships" xmlns:p="http://schemas.openxmlformats.org/presentationml/2006/main">
   <p:cSld>
+    <p:bg>
+      <p:bgPr>
+        <a:pattFill prst="dashUpDiag">
+          <a:fgClr>
+            <a:schemeClr val="accent1">
+              <a:lumMod val="40000"/>
+              <a:lumOff val="60000"/>
+            </a:schemeClr>
+          </a:fgClr>
+          <a:bgClr>
+            <a:schemeClr val="bg1"/>
+          </a:bgClr>
+        </a:pattFill>
+        <a:effectLst/>
+      </p:bgPr>
+    </p:bg>
     <p:spTree>
       <p:nvGrpSpPr>
         <p:cNvPr id="1" name=""/>
@@ -3823,6 +3918,79 @@
           <a:chExt cx="0" cy="0"/>
         </a:xfrm>
       </p:grpSpPr>
+      <p:pic>
+        <p:nvPicPr>
+          <p:cNvPr id="5" name="Picture 4">
+            <a:extLst>
+              <a:ext uri="{FF2B5EF4-FFF2-40B4-BE49-F238E27FC236}">
+                <a16:creationId xmlns:a16="http://schemas.microsoft.com/office/drawing/2014/main" id="{9D4BD67F-83D1-471E-B99D-A29C6FC83EA4}"/>
+              </a:ext>
+            </a:extLst>
+          </p:cNvPr>
+          <p:cNvPicPr>
+            <a:picLocks noChangeAspect="1"/>
+          </p:cNvPicPr>
+          <p:nvPr/>
+        </p:nvPicPr>
+        <p:blipFill>
+          <a:blip r:embed="rId2"/>
+          <a:stretch>
+            <a:fillRect/>
+          </a:stretch>
+        </p:blipFill>
+        <p:spPr>
+          <a:xfrm>
+            <a:off x="3082191" y="1205278"/>
+            <a:ext cx="6027617" cy="4902067"/>
+          </a:xfrm>
+          <a:prstGeom prst="rect">
+            <a:avLst/>
+          </a:prstGeom>
+        </p:spPr>
+      </p:pic>
+    </p:spTree>
+    <p:extLst>
+      <p:ext uri="{BB962C8B-B14F-4D97-AF65-F5344CB8AC3E}">
+        <p14:creationId xmlns:p14="http://schemas.microsoft.com/office/powerpoint/2010/main" val="1846890682"/>
+      </p:ext>
+    </p:extLst>
+  </p:cSld>
+  <p:clrMapOvr>
+    <a:masterClrMapping/>
+  </p:clrMapOvr>
+</p:sld>
+</file>
+
+<file path=ppt/slides/slide13.xml><?xml version="1.0" encoding="utf-8"?>
+<p:sld xmlns:a="http://schemas.openxmlformats.org/drawingml/2006/main" xmlns:r="http://schemas.openxmlformats.org/officeDocument/2006/relationships" xmlns:p="http://schemas.openxmlformats.org/presentationml/2006/main">
+  <p:cSld>
+    <p:bg>
+      <p:bgPr>
+        <a:pattFill prst="dashVert">
+          <a:fgClr>
+            <a:srgbClr val="92D050"/>
+          </a:fgClr>
+          <a:bgClr>
+            <a:schemeClr val="bg1"/>
+          </a:bgClr>
+        </a:pattFill>
+        <a:effectLst/>
+      </p:bgPr>
+    </p:bg>
+    <p:spTree>
+      <p:nvGrpSpPr>
+        <p:cNvPr id="1" name=""/>
+        <p:cNvGrpSpPr/>
+        <p:nvPr/>
+      </p:nvGrpSpPr>
+      <p:grpSpPr>
+        <a:xfrm>
+          <a:off x="0" y="0"/>
+          <a:ext cx="0" cy="0"/>
+          <a:chOff x="0" y="0"/>
+          <a:chExt cx="0" cy="0"/>
+        </a:xfrm>
+      </p:grpSpPr>
       <p:sp>
         <p:nvSpPr>
           <p:cNvPr id="2" name="Title 1">
@@ -3869,7 +4037,9 @@
             <p:ph idx="1"/>
           </p:nvPr>
         </p:nvSpPr>
-        <p:spPr/>
+        <p:spPr>
+          <a:noFill/>
+        </p:spPr>
         <p:txBody>
           <a:bodyPr/>
           <a:lstStyle/>
@@ -3908,7 +4078,7 @@
             <a:pPr lvl="1"/>
             <a:r>
               <a:rPr lang="en-US" dirty="0"/>
-              <a:t>Tether (USTD) is the most unstable </a:t>
+              <a:t>Tether (USDT) is the most unstable </a:t>
             </a:r>
           </a:p>
         </p:txBody>
@@ -3929,6 +4099,22 @@
 <file path=ppt/slides/slide2.xml><?xml version="1.0" encoding="utf-8"?>
 <p:sld xmlns:a="http://schemas.openxmlformats.org/drawingml/2006/main" xmlns:r="http://schemas.openxmlformats.org/officeDocument/2006/relationships" xmlns:p="http://schemas.openxmlformats.org/presentationml/2006/main">
   <p:cSld>
+    <p:bg>
+      <p:bgPr>
+        <a:pattFill prst="pct80">
+          <a:fgClr>
+            <a:schemeClr val="accent5">
+              <a:lumMod val="20000"/>
+              <a:lumOff val="80000"/>
+            </a:schemeClr>
+          </a:fgClr>
+          <a:bgClr>
+            <a:schemeClr val="accent1"/>
+          </a:bgClr>
+        </a:pattFill>
+        <a:effectLst/>
+      </p:bgPr>
+    </p:bg>
     <p:spTree>
       <p:nvGrpSpPr>
         <p:cNvPr id="1" name=""/>
@@ -4037,6 +4223,22 @@
 <file path=ppt/slides/slide3.xml><?xml version="1.0" encoding="utf-8"?>
 <p:sld xmlns:a="http://schemas.openxmlformats.org/drawingml/2006/main" xmlns:r="http://schemas.openxmlformats.org/officeDocument/2006/relationships" xmlns:p="http://schemas.openxmlformats.org/presentationml/2006/main">
   <p:cSld>
+    <p:bg>
+      <p:bgPr>
+        <a:pattFill prst="dkUpDiag">
+          <a:fgClr>
+            <a:schemeClr val="accent6">
+              <a:lumMod val="40000"/>
+              <a:lumOff val="60000"/>
+            </a:schemeClr>
+          </a:fgClr>
+          <a:bgClr>
+            <a:schemeClr val="bg1"/>
+          </a:bgClr>
+        </a:pattFill>
+        <a:effectLst/>
+      </p:bgPr>
+    </p:bg>
     <p:spTree>
       <p:nvGrpSpPr>
         <p:cNvPr id="1" name=""/>
@@ -4095,7 +4297,9 @@
             <p:ph idx="1"/>
           </p:nvPr>
         </p:nvSpPr>
-        <p:spPr/>
+        <p:spPr>
+          <a:noFill/>
+        </p:spPr>
         <p:txBody>
           <a:bodyPr>
             <a:normAutofit/>
@@ -4188,6 +4392,19 @@
 <file path=ppt/slides/slide4.xml><?xml version="1.0" encoding="utf-8"?>
 <p:sld xmlns:a="http://schemas.openxmlformats.org/drawingml/2006/main" xmlns:r="http://schemas.openxmlformats.org/officeDocument/2006/relationships" xmlns:p="http://schemas.openxmlformats.org/presentationml/2006/main">
   <p:cSld>
+    <p:bg>
+      <p:bgPr>
+        <a:pattFill prst="openDmnd">
+          <a:fgClr>
+            <a:srgbClr val="CC99FF"/>
+          </a:fgClr>
+          <a:bgClr>
+            <a:schemeClr val="bg1"/>
+          </a:bgClr>
+        </a:pattFill>
+        <a:effectLst/>
+      </p:bgPr>
+    </p:bg>
     <p:spTree>
       <p:nvGrpSpPr>
         <p:cNvPr id="1" name=""/>
@@ -4277,6 +4494,22 @@
 <file path=ppt/slides/slide5.xml><?xml version="1.0" encoding="utf-8"?>
 <p:sld xmlns:a="http://schemas.openxmlformats.org/drawingml/2006/main" xmlns:r="http://schemas.openxmlformats.org/officeDocument/2006/relationships" xmlns:p="http://schemas.openxmlformats.org/presentationml/2006/main">
   <p:cSld>
+    <p:bg>
+      <p:bgPr>
+        <a:pattFill prst="dkVert">
+          <a:fgClr>
+            <a:schemeClr val="accent2">
+              <a:lumMod val="20000"/>
+              <a:lumOff val="80000"/>
+            </a:schemeClr>
+          </a:fgClr>
+          <a:bgClr>
+            <a:schemeClr val="bg1"/>
+          </a:bgClr>
+        </a:pattFill>
+        <a:effectLst/>
+      </p:bgPr>
+    </p:bg>
     <p:spTree>
       <p:nvGrpSpPr>
         <p:cNvPr id="1" name=""/>
@@ -5290,6 +5523,40 @@
 <file path=ppt/slides/slide9.xml><?xml version="1.0" encoding="utf-8"?>
 <p:sld xmlns:a="http://schemas.openxmlformats.org/drawingml/2006/main" xmlns:r="http://schemas.openxmlformats.org/officeDocument/2006/relationships" xmlns:p="http://schemas.openxmlformats.org/presentationml/2006/main">
   <p:cSld>
+    <p:bg>
+      <p:bgPr>
+        <a:gradFill>
+          <a:gsLst>
+            <a:gs pos="0">
+              <a:schemeClr val="accent1">
+                <a:lumMod val="5000"/>
+                <a:lumOff val="95000"/>
+              </a:schemeClr>
+            </a:gs>
+            <a:gs pos="74000">
+              <a:schemeClr val="accent1">
+                <a:lumMod val="45000"/>
+                <a:lumOff val="55000"/>
+              </a:schemeClr>
+            </a:gs>
+            <a:gs pos="83000">
+              <a:schemeClr val="accent1">
+                <a:lumMod val="45000"/>
+                <a:lumOff val="55000"/>
+              </a:schemeClr>
+            </a:gs>
+            <a:gs pos="100000">
+              <a:schemeClr val="accent1">
+                <a:lumMod val="30000"/>
+                <a:lumOff val="70000"/>
+              </a:schemeClr>
+            </a:gs>
+          </a:gsLst>
+          <a:lin ang="5400000" scaled="1"/>
+        </a:gradFill>
+        <a:effectLst/>
+      </p:bgPr>
+    </p:bg>
     <p:spTree>
       <p:nvGrpSpPr>
         <p:cNvPr id="1" name=""/>

</xml_diff>